<commit_message>
update and small clean up
</commit_message>
<xml_diff>
--- a/Query2SQL.pptx
+++ b/Query2SQL.pptx
@@ -137,6 +137,11 @@
       </a:defRPr>
     </a:lvl9pPr>
   </p:defaultTextStyle>
+  <p:extLst>
+    <p:ext uri="{EFAFB233-063F-42B5-8137-9DF3F51BA10A}">
+      <p15:sldGuideLst xmlns:p15="http://schemas.microsoft.com/office/powerpoint/2012/main"/>
+    </p:ext>
+  </p:extLst>
 </p:presentation>
 </file>
 
@@ -222,7 +227,7 @@
           <a:p>
             <a:fld id="{08ECD31F-0DDB-453B-9860-2656243CE1A1}" type="datetimeFigureOut">
               <a:rPr lang="en-US" smtClean="0"/>
-              <a:t>9/21/2022</a:t>
+              <a:t>9/23/2022</a:t>
             </a:fld>
             <a:endParaRPr lang="en-US"/>
           </a:p>
@@ -720,7 +725,7 @@
           <a:p>
             <a:fld id="{E44EE0E6-E68E-443C-B5F4-5068DAD6E55A}" type="datetimeFigureOut">
               <a:rPr lang="en-US" smtClean="0"/>
-              <a:t>9/21/2022</a:t>
+              <a:t>9/23/2022</a:t>
             </a:fld>
             <a:endParaRPr lang="en-US"/>
           </a:p>
@@ -918,7 +923,7 @@
           <a:p>
             <a:fld id="{E44EE0E6-E68E-443C-B5F4-5068DAD6E55A}" type="datetimeFigureOut">
               <a:rPr lang="en-US" smtClean="0"/>
-              <a:t>9/21/2022</a:t>
+              <a:t>9/23/2022</a:t>
             </a:fld>
             <a:endParaRPr lang="en-US"/>
           </a:p>
@@ -1126,7 +1131,7 @@
           <a:p>
             <a:fld id="{E44EE0E6-E68E-443C-B5F4-5068DAD6E55A}" type="datetimeFigureOut">
               <a:rPr lang="en-US" smtClean="0"/>
-              <a:t>9/21/2022</a:t>
+              <a:t>9/23/2022</a:t>
             </a:fld>
             <a:endParaRPr lang="en-US"/>
           </a:p>
@@ -1324,7 +1329,7 @@
           <a:p>
             <a:fld id="{E44EE0E6-E68E-443C-B5F4-5068DAD6E55A}" type="datetimeFigureOut">
               <a:rPr lang="en-US" smtClean="0"/>
-              <a:t>9/21/2022</a:t>
+              <a:t>9/23/2022</a:t>
             </a:fld>
             <a:endParaRPr lang="en-US"/>
           </a:p>
@@ -1599,7 +1604,7 @@
           <a:p>
             <a:fld id="{E44EE0E6-E68E-443C-B5F4-5068DAD6E55A}" type="datetimeFigureOut">
               <a:rPr lang="en-US" smtClean="0"/>
-              <a:t>9/21/2022</a:t>
+              <a:t>9/23/2022</a:t>
             </a:fld>
             <a:endParaRPr lang="en-US"/>
           </a:p>
@@ -1864,7 +1869,7 @@
           <a:p>
             <a:fld id="{E44EE0E6-E68E-443C-B5F4-5068DAD6E55A}" type="datetimeFigureOut">
               <a:rPr lang="en-US" smtClean="0"/>
-              <a:t>9/21/2022</a:t>
+              <a:t>9/23/2022</a:t>
             </a:fld>
             <a:endParaRPr lang="en-US"/>
           </a:p>
@@ -2276,7 +2281,7 @@
           <a:p>
             <a:fld id="{E44EE0E6-E68E-443C-B5F4-5068DAD6E55A}" type="datetimeFigureOut">
               <a:rPr lang="en-US" smtClean="0"/>
-              <a:t>9/21/2022</a:t>
+              <a:t>9/23/2022</a:t>
             </a:fld>
             <a:endParaRPr lang="en-US"/>
           </a:p>
@@ -2417,7 +2422,7 @@
           <a:p>
             <a:fld id="{E44EE0E6-E68E-443C-B5F4-5068DAD6E55A}" type="datetimeFigureOut">
               <a:rPr lang="en-US" smtClean="0"/>
-              <a:t>9/21/2022</a:t>
+              <a:t>9/23/2022</a:t>
             </a:fld>
             <a:endParaRPr lang="en-US"/>
           </a:p>
@@ -2530,7 +2535,7 @@
           <a:p>
             <a:fld id="{E44EE0E6-E68E-443C-B5F4-5068DAD6E55A}" type="datetimeFigureOut">
               <a:rPr lang="en-US" smtClean="0"/>
-              <a:t>9/21/2022</a:t>
+              <a:t>9/23/2022</a:t>
             </a:fld>
             <a:endParaRPr lang="en-US"/>
           </a:p>
@@ -2841,7 +2846,7 @@
           <a:p>
             <a:fld id="{E44EE0E6-E68E-443C-B5F4-5068DAD6E55A}" type="datetimeFigureOut">
               <a:rPr lang="en-US" smtClean="0"/>
-              <a:t>9/21/2022</a:t>
+              <a:t>9/23/2022</a:t>
             </a:fld>
             <a:endParaRPr lang="en-US"/>
           </a:p>
@@ -3129,7 +3134,7 @@
           <a:p>
             <a:fld id="{E44EE0E6-E68E-443C-B5F4-5068DAD6E55A}" type="datetimeFigureOut">
               <a:rPr lang="en-US" smtClean="0"/>
-              <a:t>9/21/2022</a:t>
+              <a:t>9/23/2022</a:t>
             </a:fld>
             <a:endParaRPr lang="en-US"/>
           </a:p>
@@ -3370,7 +3375,7 @@
           <a:p>
             <a:fld id="{E44EE0E6-E68E-443C-B5F4-5068DAD6E55A}" type="datetimeFigureOut">
               <a:rPr lang="en-US" smtClean="0"/>
-              <a:t>9/21/2022</a:t>
+              <a:t>9/23/2022</a:t>
             </a:fld>
             <a:endParaRPr lang="en-US"/>
           </a:p>
@@ -7779,25 +7784,75 @@
           <a:lstStyle/>
           <a:p>
             <a:r>
+              <a:rPr lang="ru-RU" dirty="0">
+                <a:latin typeface="-apple-system"/>
+              </a:rPr>
+              <a:t>Е</a:t>
+            </a:r>
+            <a:r>
               <a:rPr lang="ru-RU" b="0" i="0" dirty="0">
                 <a:effectLst/>
                 <a:latin typeface="-apple-system"/>
               </a:rPr>
-              <a:t>есть таблица. Мы хотим предоставить пользователю возможность составлять выражения в своём синтаксисе так, чтобы они </a:t>
-            </a:r>
-            <a:r>
-              <a:rPr lang="ru-RU" b="0" i="0" dirty="0" err="1">
-                <a:effectLst/>
+              <a:t>сть схема данных и ее наполнение. Мы хотим предоставить пользователю возможность составлять выражения в своём синтаксисе так, чтобы они вычислялись в базе данных</a:t>
+            </a:r>
+            <a:r>
+              <a:rPr lang="en-US" dirty="0">
                 <a:latin typeface="-apple-system"/>
               </a:rPr>
-              <a:t>вычисллялись</a:t>
-            </a:r>
-            <a:r>
-              <a:rPr lang="ru-RU" b="0" i="0" dirty="0">
-                <a:effectLst/>
+              <a:t>.</a:t>
+            </a:r>
+            <a:endParaRPr lang="ru-RU" dirty="0">
+              <a:latin typeface="-apple-system"/>
+            </a:endParaRPr>
+          </a:p>
+          <a:p>
+            <a:endParaRPr lang="ru-RU" dirty="0">
+              <a:latin typeface="-apple-system"/>
+            </a:endParaRPr>
+          </a:p>
+          <a:p>
+            <a:r>
+              <a:rPr lang="en-US" dirty="0">
                 <a:latin typeface="-apple-system"/>
               </a:rPr>
-              <a:t> в базе данных</a:t>
+              <a:t>col(start) &lt; col(end) </a:t>
+            </a:r>
+            <a:r>
+              <a:rPr lang="ru-RU" dirty="0">
+                <a:latin typeface="-apple-system"/>
+              </a:rPr>
+              <a:t> или </a:t>
+            </a:r>
+            <a:r>
+              <a:rPr lang="en-US" dirty="0">
+                <a:latin typeface="-apple-system"/>
+              </a:rPr>
+              <a:t>col(</a:t>
+            </a:r>
+            <a:r>
+              <a:rPr lang="en-US" dirty="0" err="1">
+                <a:latin typeface="-apple-system"/>
+              </a:rPr>
+              <a:t>startFact</a:t>
+            </a:r>
+            <a:r>
+              <a:rPr lang="en-US" dirty="0">
+                <a:latin typeface="-apple-system"/>
+              </a:rPr>
+              <a:t>) + col(duration) &lt; col(</a:t>
+            </a:r>
+            <a:r>
+              <a:rPr lang="en-US" dirty="0" err="1">
+                <a:latin typeface="-apple-system"/>
+              </a:rPr>
+              <a:t>endPlan</a:t>
+            </a:r>
+            <a:r>
+              <a:rPr lang="en-US" dirty="0">
+                <a:latin typeface="-apple-system"/>
+              </a:rPr>
+              <a:t>)</a:t>
             </a:r>
             <a:endParaRPr lang="en-US" dirty="0"/>
           </a:p>
@@ -8386,9 +8441,57 @@
           <a:p>
             <a:r>
               <a:rPr lang="ru-RU" dirty="0"/>
-              <a:t>можно ли попробовать составлять SQL самому. Сделать разбор синтаксиса и генерировать SQL. Звучит довольно сложно (сделать разбор выражения сложно само по себе плюс).</a:t>
-            </a:r>
-            <a:endParaRPr lang="en-US" dirty="0"/>
+              <a:t>можно ли попробовать составлять SQL самому. Сделать разбор синтаксиса и генерировать SQL. Звучит довольно сложно (сделать разбор выражения сложно само по себе).</a:t>
+            </a:r>
+            <a:r>
+              <a:rPr lang="en-US" dirty="0"/>
+              <a:t> </a:t>
+            </a:r>
+            <a:endParaRPr lang="ru-RU" dirty="0"/>
+          </a:p>
+          <a:p>
+            <a:r>
+              <a:rPr lang="ru-RU" dirty="0"/>
+              <a:t>Плюсы</a:t>
+            </a:r>
+          </a:p>
+          <a:p>
+            <a:pPr lvl="1"/>
+            <a:r>
+              <a:rPr lang="ru-RU" dirty="0"/>
+              <a:t>полное управление</a:t>
+            </a:r>
+          </a:p>
+          <a:p>
+            <a:pPr lvl="1"/>
+            <a:r>
+              <a:rPr lang="ru-RU" dirty="0"/>
+              <a:t>только то, что нужно</a:t>
+            </a:r>
+          </a:p>
+          <a:p>
+            <a:r>
+              <a:rPr lang="ru-RU" dirty="0"/>
+              <a:t>Минусы</a:t>
+            </a:r>
+          </a:p>
+          <a:p>
+            <a:pPr lvl="1"/>
+            <a:r>
+              <a:rPr lang="ru-RU" dirty="0"/>
+              <a:t>всю работу нужно проделать с нуля</a:t>
+            </a:r>
+          </a:p>
+          <a:p>
+            <a:pPr lvl="1"/>
+            <a:r>
+              <a:rPr lang="ru-RU" dirty="0"/>
+              <a:t>сложно маштабировать (точнее предугадать где заложить маштабирование)</a:t>
+            </a:r>
+          </a:p>
+          <a:p>
+            <a:pPr lvl="1"/>
+            <a:endParaRPr lang="ru-RU" dirty="0"/>
           </a:p>
         </p:txBody>
       </p:sp>
@@ -8571,7 +8674,14 @@
           <a:bodyPr/>
           <a:lstStyle/>
           <a:p>
-            <a:endParaRPr lang="en-US"/>
+            <a:r>
+              <a:rPr lang="ru-RU" dirty="0"/>
+              <a:t>Формирование </a:t>
+            </a:r>
+            <a:r>
+              <a:rPr lang="en-US" dirty="0"/>
+              <a:t>SQL</a:t>
+            </a:r>
           </a:p>
         </p:txBody>
       </p:sp>
@@ -8663,7 +8773,14 @@
           <a:bodyPr/>
           <a:lstStyle/>
           <a:p>
-            <a:endParaRPr lang="en-US"/>
+            <a:r>
+              <a:rPr lang="ru-RU" dirty="0"/>
+              <a:t>Используем </a:t>
+            </a:r>
+            <a:r>
+              <a:rPr lang="en-US" dirty="0"/>
+              <a:t>EF</a:t>
+            </a:r>
           </a:p>
         </p:txBody>
       </p:sp>
@@ -8701,10 +8818,17 @@
               <a:t> с описанием схемы данных и добавляем туда наше выражение. А потом генерируем SQL при помощи </a:t>
             </a:r>
             <a:r>
-              <a:rPr lang="ru-RU" dirty="0" err="1"/>
+              <a:rPr lang="en-US" dirty="0"/>
+              <a:t>To</a:t>
+            </a:r>
+            <a:r>
+              <a:rPr lang="ru-RU" dirty="0"/>
               <a:t>QueryString</a:t>
             </a:r>
-            <a:endParaRPr lang="en-US" dirty="0"/>
+            <a:r>
+              <a:rPr lang="en-US" dirty="0"/>
+              <a:t>()</a:t>
+            </a:r>
           </a:p>
         </p:txBody>
       </p:sp>

</xml_diff>